<commit_message>
feat: update slide [container runtime eval]
</commit_message>
<xml_diff>
--- a/slide/Docker container resources 사용량 측정.pptx
+++ b/slide/Docker container resources 사용량 측정.pptx
@@ -5,7 +5,7 @@
     <p:sldMasterId id="2147483648" r:id="rId1"/>
   </p:sldMasterIdLst>
   <p:notesMasterIdLst>
-    <p:notesMasterId r:id="rId14"/>
+    <p:notesMasterId r:id="rId15"/>
   </p:notesMasterIdLst>
   <p:sldIdLst>
     <p:sldId id="259" r:id="rId2"/>
@@ -20,28 +20,29 @@
     <p:sldId id="268" r:id="rId11"/>
     <p:sldId id="269" r:id="rId12"/>
     <p:sldId id="270" r:id="rId13"/>
+    <p:sldId id="271" r:id="rId14"/>
   </p:sldIdLst>
   <p:sldSz cx="12192000" cy="6858000"/>
   <p:notesSz cx="6858000" cy="9144000"/>
   <p:embeddedFontLst>
     <p:embeddedFont>
-      <p:font typeface="lato" panose="020F0502020204030203" pitchFamily="34" charset="0"/>
-      <p:regular r:id="rId15"/>
-      <p:bold r:id="rId16"/>
-      <p:italic r:id="rId17"/>
-      <p:boldItalic r:id="rId18"/>
+      <p:font typeface="lato" panose="020B0600000101010101" charset="0"/>
+      <p:regular r:id="rId16"/>
+      <p:bold r:id="rId17"/>
+      <p:italic r:id="rId18"/>
+      <p:boldItalic r:id="rId19"/>
     </p:embeddedFont>
     <p:embeddedFont>
-      <p:font typeface="lato" panose="020F0502020204030203" pitchFamily="34" charset="0"/>
-      <p:regular r:id="rId15"/>
-      <p:bold r:id="rId16"/>
-      <p:italic r:id="rId17"/>
-      <p:boldItalic r:id="rId18"/>
+      <p:font typeface="lato" panose="020B0600000101010101" charset="0"/>
+      <p:regular r:id="rId16"/>
+      <p:bold r:id="rId17"/>
+      <p:italic r:id="rId18"/>
+      <p:boldItalic r:id="rId19"/>
     </p:embeddedFont>
     <p:embeddedFont>
       <p:font typeface="맑은 고딕" panose="020B0503020000020004" pitchFamily="50" charset="-127"/>
-      <p:regular r:id="rId19"/>
-      <p:bold r:id="rId20"/>
+      <p:regular r:id="rId20"/>
+      <p:bold r:id="rId21"/>
     </p:embeddedFont>
   </p:embeddedFontLst>
   <p:kinsoku lang="ko-KR" invalStChars="、。，．：；？！’”）〕］｝〉》」』】°℃％!%￠),.:;?]}&gt;" invalEndChars="‘“（〔［｛〈《「『【￥＄\￦￡€([{&lt;$"/>
@@ -261,7 +262,7 @@
           <a:p>
             <a:fld id="{3B653B65-7BB5-4D60-9879-5AFC8E04B446}" type="datetimeFigureOut">
               <a:rPr lang="ko-KR" altLang="en-US" smtClean="0"/>
-              <a:t>2022-01-19</a:t>
+              <a:t>2022-02-21</a:t>
             </a:fld>
             <a:endParaRPr lang="ko-KR" altLang="en-US"/>
           </a:p>
@@ -771,6 +772,90 @@
     <p:extLst>
       <p:ext uri="{BB962C8B-B14F-4D97-AF65-F5344CB8AC3E}">
         <p14:creationId xmlns:p14="http://schemas.microsoft.com/office/powerpoint/2010/main" val="2482813493"/>
+      </p:ext>
+    </p:extLst>
+  </p:cSld>
+  <p:clrMapOvr>
+    <a:masterClrMapping/>
+  </p:clrMapOvr>
+</p:notes>
+</file>
+
+<file path=ppt/notesSlides/notesSlide4.xml><?xml version="1.0" encoding="utf-8"?>
+<p:notes xmlns:a="http://schemas.openxmlformats.org/drawingml/2006/main" xmlns:r="http://schemas.openxmlformats.org/officeDocument/2006/relationships" xmlns:p="http://schemas.openxmlformats.org/presentationml/2006/main">
+  <p:cSld>
+    <p:spTree>
+      <p:nvGrpSpPr>
+        <p:cNvPr id="1" name=""/>
+        <p:cNvGrpSpPr/>
+        <p:nvPr/>
+      </p:nvGrpSpPr>
+      <p:grpSpPr>
+        <a:xfrm>
+          <a:off x="0" y="0"/>
+          <a:ext cx="0" cy="0"/>
+          <a:chOff x="0" y="0"/>
+          <a:chExt cx="0" cy="0"/>
+        </a:xfrm>
+      </p:grpSpPr>
+      <p:sp>
+        <p:nvSpPr>
+          <p:cNvPr id="2" name="슬라이드 이미지 개체 틀 1"/>
+          <p:cNvSpPr>
+            <a:spLocks noGrp="1" noRot="1" noChangeAspect="1"/>
+          </p:cNvSpPr>
+          <p:nvPr>
+            <p:ph type="sldImg"/>
+          </p:nvPr>
+        </p:nvSpPr>
+        <p:spPr/>
+      </p:sp>
+      <p:sp>
+        <p:nvSpPr>
+          <p:cNvPr id="3" name="슬라이드 노트 개체 틀 2"/>
+          <p:cNvSpPr>
+            <a:spLocks noGrp="1"/>
+          </p:cNvSpPr>
+          <p:nvPr>
+            <p:ph type="body" idx="1"/>
+          </p:nvPr>
+        </p:nvSpPr>
+        <p:spPr/>
+        <p:txBody>
+          <a:bodyPr/>
+          <a:lstStyle/>
+          <a:p>
+            <a:endParaRPr lang="ko-KR" altLang="en-US" dirty="0"/>
+          </a:p>
+        </p:txBody>
+      </p:sp>
+      <p:sp>
+        <p:nvSpPr>
+          <p:cNvPr id="4" name="슬라이드 번호 개체 틀 3"/>
+          <p:cNvSpPr>
+            <a:spLocks noGrp="1"/>
+          </p:cNvSpPr>
+          <p:nvPr>
+            <p:ph type="sldNum" sz="quarter" idx="5"/>
+          </p:nvPr>
+        </p:nvSpPr>
+        <p:spPr/>
+        <p:txBody>
+          <a:bodyPr/>
+          <a:lstStyle/>
+          <a:p>
+            <a:fld id="{2CB6E87F-228F-44B2-B4EE-9BD47B249A9D}" type="slidenum">
+              <a:rPr lang="ko-KR" altLang="en-US" smtClean="0"/>
+              <a:t>13</a:t>
+            </a:fld>
+            <a:endParaRPr lang="ko-KR" altLang="en-US"/>
+          </a:p>
+        </p:txBody>
+      </p:sp>
+    </p:spTree>
+    <p:extLst>
+      <p:ext uri="{BB962C8B-B14F-4D97-AF65-F5344CB8AC3E}">
+        <p14:creationId xmlns:p14="http://schemas.microsoft.com/office/powerpoint/2010/main" val="4236633474"/>
       </p:ext>
     </p:extLst>
   </p:cSld>
@@ -2535,6 +2620,288 @@
     <p:extLst>
       <p:ext uri="{BB962C8B-B14F-4D97-AF65-F5344CB8AC3E}">
         <p14:creationId xmlns:p14="http://schemas.microsoft.com/office/powerpoint/2010/main" val="3824972624"/>
+      </p:ext>
+    </p:extLst>
+  </p:cSld>
+  <p:clrMapOvr>
+    <a:masterClrMapping/>
+  </p:clrMapOvr>
+</p:sld>
+</file>
+
+<file path=ppt/slides/slide13.xml><?xml version="1.0" encoding="utf-8"?>
+<p:sld xmlns:a="http://schemas.openxmlformats.org/drawingml/2006/main" xmlns:r="http://schemas.openxmlformats.org/officeDocument/2006/relationships" xmlns:p="http://schemas.openxmlformats.org/presentationml/2006/main">
+  <p:cSld>
+    <p:spTree>
+      <p:nvGrpSpPr>
+        <p:cNvPr id="1" name=""/>
+        <p:cNvGrpSpPr/>
+        <p:nvPr/>
+      </p:nvGrpSpPr>
+      <p:grpSpPr>
+        <a:xfrm>
+          <a:off x="0" y="0"/>
+          <a:ext cx="0" cy="0"/>
+          <a:chOff x="0" y="0"/>
+          <a:chExt cx="0" cy="0"/>
+        </a:xfrm>
+      </p:grpSpPr>
+      <p:sp>
+        <p:nvSpPr>
+          <p:cNvPr id="2" name="제목 1">
+            <a:extLst>
+              <a:ext uri="{FF2B5EF4-FFF2-40B4-BE49-F238E27FC236}">
+                <a16:creationId xmlns:a16="http://schemas.microsoft.com/office/drawing/2014/main" id="{AFF6EF3C-B5C8-4FCD-BE8B-2AB31DA3CCE4}"/>
+              </a:ext>
+            </a:extLst>
+          </p:cNvPr>
+          <p:cNvSpPr>
+            <a:spLocks noGrp="1"/>
+          </p:cNvSpPr>
+          <p:nvPr>
+            <p:ph type="title"/>
+          </p:nvPr>
+        </p:nvSpPr>
+        <p:spPr/>
+        <p:txBody>
+          <a:bodyPr/>
+          <a:lstStyle/>
+          <a:p>
+            <a:r>
+              <a:rPr kumimoji="1" lang="en-US" altLang="ko-KR" dirty="0"/>
+              <a:t>Resources </a:t>
+            </a:r>
+            <a:r>
+              <a:rPr kumimoji="1" lang="ko-KR" altLang="en-US" dirty="0"/>
+              <a:t>사용량 측정</a:t>
+            </a:r>
+            <a:endParaRPr lang="ko-KR" altLang="en-US" dirty="0"/>
+          </a:p>
+        </p:txBody>
+      </p:sp>
+      <p:sp>
+        <p:nvSpPr>
+          <p:cNvPr id="4" name="슬라이드 번호 개체 틀 3">
+            <a:extLst>
+              <a:ext uri="{FF2B5EF4-FFF2-40B4-BE49-F238E27FC236}">
+                <a16:creationId xmlns:a16="http://schemas.microsoft.com/office/drawing/2014/main" id="{466F1A6B-A546-4F3D-BD25-184AC7C1FDAB}"/>
+              </a:ext>
+            </a:extLst>
+          </p:cNvPr>
+          <p:cNvSpPr>
+            <a:spLocks noGrp="1"/>
+          </p:cNvSpPr>
+          <p:nvPr>
+            <p:ph type="sldNum" sz="quarter" idx="4"/>
+          </p:nvPr>
+        </p:nvSpPr>
+        <p:spPr/>
+        <p:txBody>
+          <a:bodyPr/>
+          <a:lstStyle/>
+          <a:p>
+            <a:fld id="{765CECA1-5C9B-4693-A1BD-3F65156FCD02}" type="slidenum">
+              <a:rPr lang="ko-KR" altLang="en-US" smtClean="0"/>
+              <a:pPr/>
+              <a:t>13</a:t>
+            </a:fld>
+            <a:endParaRPr lang="ko-KR" altLang="en-US" dirty="0"/>
+          </a:p>
+        </p:txBody>
+      </p:sp>
+      <p:sp>
+        <p:nvSpPr>
+          <p:cNvPr id="7" name="내용 개체 틀 6">
+            <a:extLst>
+              <a:ext uri="{FF2B5EF4-FFF2-40B4-BE49-F238E27FC236}">
+                <a16:creationId xmlns:a16="http://schemas.microsoft.com/office/drawing/2014/main" id="{CC58BA12-7DCD-474B-9DB4-CD698573CE4F}"/>
+              </a:ext>
+            </a:extLst>
+          </p:cNvPr>
+          <p:cNvSpPr>
+            <a:spLocks noGrp="1"/>
+          </p:cNvSpPr>
+          <p:nvPr>
+            <p:ph idx="1"/>
+          </p:nvPr>
+        </p:nvSpPr>
+        <p:spPr/>
+        <p:txBody>
+          <a:bodyPr/>
+          <a:lstStyle/>
+          <a:p>
+            <a:r>
+              <a:rPr lang="ko-KR" altLang="en-US" dirty="0"/>
+              <a:t>컨테이너 동시 실행 </a:t>
+            </a:r>
+            <a:r>
+              <a:rPr lang="ko-KR" altLang="en-US" dirty="0" err="1"/>
+              <a:t>개수별</a:t>
+            </a:r>
+            <a:r>
+              <a:rPr lang="ko-KR" altLang="en-US" dirty="0"/>
+              <a:t> 실행시간 비교</a:t>
+            </a:r>
+            <a:endParaRPr lang="en-US" altLang="ko-KR" dirty="0"/>
+          </a:p>
+          <a:p>
+            <a:r>
+              <a:rPr lang="en-US" altLang="ko-KR" dirty="0"/>
+              <a:t>526MB CSV File </a:t>
+            </a:r>
+            <a:r>
+              <a:rPr lang="ko-KR" altLang="en-US" dirty="0"/>
+              <a:t>복사 워크로드</a:t>
+            </a:r>
+            <a:endParaRPr lang="en-US" altLang="ko-KR" dirty="0"/>
+          </a:p>
+          <a:p>
+            <a:r>
+              <a:rPr lang="en-US" altLang="ko-KR" dirty="0"/>
+              <a:t>CSV </a:t>
+            </a:r>
+            <a:r>
+              <a:rPr lang="ko-KR" altLang="en-US" dirty="0"/>
+              <a:t>파일 복사 실행 시간 측정</a:t>
+            </a:r>
+            <a:endParaRPr lang="en-US" altLang="ko-KR" dirty="0"/>
+          </a:p>
+          <a:p>
+            <a:pPr lvl="1"/>
+            <a:r>
+              <a:rPr lang="ko-KR" altLang="en-US" dirty="0"/>
+              <a:t>컨테이너 </a:t>
+            </a:r>
+            <a:r>
+              <a:rPr lang="ko-KR" altLang="en-US" dirty="0" err="1"/>
+              <a:t>개수당</a:t>
+            </a:r>
+            <a:r>
+              <a:rPr lang="ko-KR" altLang="en-US" dirty="0"/>
+              <a:t> 실행 시간 비교</a:t>
+            </a:r>
+            <a:endParaRPr lang="en-US" altLang="ko-KR" dirty="0"/>
+          </a:p>
+          <a:p>
+            <a:pPr lvl="1"/>
+            <a:r>
+              <a:rPr lang="en-US" altLang="ko-KR" dirty="0"/>
+              <a:t>1</a:t>
+            </a:r>
+            <a:r>
+              <a:rPr lang="ko-KR" altLang="en-US" dirty="0"/>
+              <a:t>개 </a:t>
+            </a:r>
+            <a:r>
+              <a:rPr lang="en-US" altLang="ko-KR" dirty="0"/>
+              <a:t>10.27s</a:t>
+            </a:r>
+          </a:p>
+          <a:p>
+            <a:pPr lvl="1"/>
+            <a:r>
+              <a:rPr lang="en-US" altLang="ko-KR" dirty="0"/>
+              <a:t>2</a:t>
+            </a:r>
+            <a:r>
+              <a:rPr lang="ko-KR" altLang="en-US" dirty="0"/>
+              <a:t>개 </a:t>
+            </a:r>
+            <a:r>
+              <a:rPr lang="en-US" altLang="ko-KR" dirty="0"/>
+              <a:t>10.89s</a:t>
+            </a:r>
+          </a:p>
+          <a:p>
+            <a:pPr lvl="1"/>
+            <a:r>
+              <a:rPr lang="en-US" altLang="ko-KR" dirty="0"/>
+              <a:t>3</a:t>
+            </a:r>
+            <a:r>
+              <a:rPr lang="ko-KR" altLang="en-US" dirty="0"/>
+              <a:t>개 </a:t>
+            </a:r>
+            <a:r>
+              <a:rPr lang="en-US" altLang="ko-KR" dirty="0"/>
+              <a:t>11.90s</a:t>
+            </a:r>
+          </a:p>
+          <a:p>
+            <a:pPr lvl="1"/>
+            <a:r>
+              <a:rPr lang="en-US" altLang="ko-KR" dirty="0"/>
+              <a:t>4</a:t>
+            </a:r>
+            <a:r>
+              <a:rPr lang="ko-KR" altLang="en-US" dirty="0"/>
+              <a:t>개 </a:t>
+            </a:r>
+            <a:r>
+              <a:rPr lang="en-US" altLang="ko-KR" dirty="0"/>
+              <a:t>11.64s</a:t>
+            </a:r>
+          </a:p>
+          <a:p>
+            <a:pPr lvl="1"/>
+            <a:r>
+              <a:rPr lang="en-US" altLang="ko-KR" dirty="0"/>
+              <a:t>5</a:t>
+            </a:r>
+            <a:r>
+              <a:rPr lang="ko-KR" altLang="en-US" dirty="0"/>
+              <a:t>개 </a:t>
+            </a:r>
+            <a:r>
+              <a:rPr lang="en-US" altLang="ko-KR" dirty="0"/>
+              <a:t>12.22s</a:t>
+            </a:r>
+          </a:p>
+          <a:p>
+            <a:endParaRPr lang="ko-KR" altLang="en-US" dirty="0"/>
+          </a:p>
+        </p:txBody>
+      </p:sp>
+      <p:pic>
+        <p:nvPicPr>
+          <p:cNvPr id="8" name="내용 개체 틀 5">
+            <a:extLst>
+              <a:ext uri="{FF2B5EF4-FFF2-40B4-BE49-F238E27FC236}">
+                <a16:creationId xmlns:a16="http://schemas.microsoft.com/office/drawing/2014/main" id="{3ABEF2C1-5842-4ED6-BF9E-6505FF1ED47E}"/>
+              </a:ext>
+            </a:extLst>
+          </p:cNvPr>
+          <p:cNvPicPr>
+            <a:picLocks noChangeAspect="1"/>
+          </p:cNvPicPr>
+          <p:nvPr/>
+        </p:nvPicPr>
+        <p:blipFill>
+          <a:blip r:embed="rId3">
+            <a:extLst>
+              <a:ext uri="{28A0092B-C50C-407E-A947-70E740481C1C}">
+                <a14:useLocalDpi xmlns:a14="http://schemas.microsoft.com/office/drawing/2010/main" val="0"/>
+              </a:ext>
+            </a:extLst>
+          </a:blip>
+          <a:stretch>
+            <a:fillRect/>
+          </a:stretch>
+        </p:blipFill>
+        <p:spPr>
+          <a:xfrm>
+            <a:off x="6084570" y="1684011"/>
+            <a:ext cx="5852172" cy="4389129"/>
+          </a:xfrm>
+          <a:prstGeom prst="rect">
+            <a:avLst/>
+          </a:prstGeom>
+        </p:spPr>
+      </p:pic>
+    </p:spTree>
+    <p:extLst>
+      <p:ext uri="{BB962C8B-B14F-4D97-AF65-F5344CB8AC3E}">
+        <p14:creationId xmlns:p14="http://schemas.microsoft.com/office/powerpoint/2010/main" val="1977134346"/>
       </p:ext>
     </p:extLst>
   </p:cSld>

</xml_diff>

<commit_message>
fix: read result matplotlib
</commit_message>
<xml_diff>
--- a/slide/Docker container resources 사용량 측정.pptx
+++ b/slide/Docker container resources 사용량 측정.pptx
@@ -5,7 +5,7 @@
     <p:sldMasterId id="2147483648" r:id="rId1"/>
   </p:sldMasterIdLst>
   <p:notesMasterIdLst>
-    <p:notesMasterId r:id="rId15"/>
+    <p:notesMasterId r:id="rId17"/>
   </p:notesMasterIdLst>
   <p:sldIdLst>
     <p:sldId id="259" r:id="rId2"/>
@@ -21,28 +21,30 @@
     <p:sldId id="269" r:id="rId12"/>
     <p:sldId id="270" r:id="rId13"/>
     <p:sldId id="271" r:id="rId14"/>
+    <p:sldId id="272" r:id="rId15"/>
+    <p:sldId id="273" r:id="rId16"/>
   </p:sldIdLst>
   <p:sldSz cx="12192000" cy="6858000"/>
   <p:notesSz cx="6858000" cy="9144000"/>
   <p:embeddedFontLst>
     <p:embeddedFont>
       <p:font typeface="lato" panose="020B0600000101010101" charset="0"/>
-      <p:regular r:id="rId16"/>
-      <p:bold r:id="rId17"/>
-      <p:italic r:id="rId18"/>
-      <p:boldItalic r:id="rId19"/>
+      <p:regular r:id="rId18"/>
+      <p:bold r:id="rId19"/>
+      <p:italic r:id="rId20"/>
+      <p:boldItalic r:id="rId21"/>
     </p:embeddedFont>
     <p:embeddedFont>
       <p:font typeface="lato" panose="020B0600000101010101" charset="0"/>
-      <p:regular r:id="rId16"/>
-      <p:bold r:id="rId17"/>
-      <p:italic r:id="rId18"/>
-      <p:boldItalic r:id="rId19"/>
+      <p:regular r:id="rId18"/>
+      <p:bold r:id="rId19"/>
+      <p:italic r:id="rId20"/>
+      <p:boldItalic r:id="rId21"/>
     </p:embeddedFont>
     <p:embeddedFont>
       <p:font typeface="맑은 고딕" panose="020B0503020000020004" pitchFamily="50" charset="-127"/>
-      <p:regular r:id="rId20"/>
-      <p:bold r:id="rId21"/>
+      <p:regular r:id="rId22"/>
+      <p:bold r:id="rId23"/>
     </p:embeddedFont>
   </p:embeddedFontLst>
   <p:kinsoku lang="ko-KR" invalStChars="、。，．：；？！’”）〕］｝〉》」』】°℃％!%￠),.:;?]}&gt;" invalEndChars="‘“（〔［｛〈《「『【￥＄\￦￡€([{&lt;$"/>
@@ -262,7 +264,7 @@
           <a:p>
             <a:fld id="{3B653B65-7BB5-4D60-9879-5AFC8E04B446}" type="datetimeFigureOut">
               <a:rPr lang="ko-KR" altLang="en-US" smtClean="0"/>
-              <a:t>2022-02-21</a:t>
+              <a:t>2022-03-10</a:t>
             </a:fld>
             <a:endParaRPr lang="ko-KR" altLang="en-US"/>
           </a:p>
@@ -2902,6 +2904,409 @@
     <p:extLst>
       <p:ext uri="{BB962C8B-B14F-4D97-AF65-F5344CB8AC3E}">
         <p14:creationId xmlns:p14="http://schemas.microsoft.com/office/powerpoint/2010/main" val="1977134346"/>
+      </p:ext>
+    </p:extLst>
+  </p:cSld>
+  <p:clrMapOvr>
+    <a:masterClrMapping/>
+  </p:clrMapOvr>
+</p:sld>
+</file>
+
+<file path=ppt/slides/slide14.xml><?xml version="1.0" encoding="utf-8"?>
+<p:sld xmlns:a="http://schemas.openxmlformats.org/drawingml/2006/main" xmlns:r="http://schemas.openxmlformats.org/officeDocument/2006/relationships" xmlns:p="http://schemas.openxmlformats.org/presentationml/2006/main">
+  <p:cSld>
+    <p:spTree>
+      <p:nvGrpSpPr>
+        <p:cNvPr id="1" name=""/>
+        <p:cNvGrpSpPr/>
+        <p:nvPr/>
+      </p:nvGrpSpPr>
+      <p:grpSpPr>
+        <a:xfrm>
+          <a:off x="0" y="0"/>
+          <a:ext cx="0" cy="0"/>
+          <a:chOff x="0" y="0"/>
+          <a:chExt cx="0" cy="0"/>
+        </a:xfrm>
+      </p:grpSpPr>
+      <p:sp>
+        <p:nvSpPr>
+          <p:cNvPr id="2" name="제목 1">
+            <a:extLst>
+              <a:ext uri="{FF2B5EF4-FFF2-40B4-BE49-F238E27FC236}">
+                <a16:creationId xmlns:a16="http://schemas.microsoft.com/office/drawing/2014/main" id="{C7285C60-BE07-4457-B72D-E9C2C19A5BC9}"/>
+              </a:ext>
+            </a:extLst>
+          </p:cNvPr>
+          <p:cNvSpPr>
+            <a:spLocks noGrp="1"/>
+          </p:cNvSpPr>
+          <p:nvPr>
+            <p:ph type="title"/>
+          </p:nvPr>
+        </p:nvSpPr>
+        <p:spPr/>
+        <p:txBody>
+          <a:bodyPr/>
+          <a:lstStyle/>
+          <a:p>
+            <a:r>
+              <a:rPr kumimoji="1" lang="en-US" altLang="ko-KR" dirty="0"/>
+              <a:t>Resources </a:t>
+            </a:r>
+            <a:r>
+              <a:rPr kumimoji="1" lang="ko-KR" altLang="en-US" dirty="0"/>
+              <a:t>사용량 측정</a:t>
+            </a:r>
+            <a:endParaRPr lang="ko-KR" altLang="en-US" dirty="0"/>
+          </a:p>
+        </p:txBody>
+      </p:sp>
+      <p:sp>
+        <p:nvSpPr>
+          <p:cNvPr id="4" name="슬라이드 번호 개체 틀 3">
+            <a:extLst>
+              <a:ext uri="{FF2B5EF4-FFF2-40B4-BE49-F238E27FC236}">
+                <a16:creationId xmlns:a16="http://schemas.microsoft.com/office/drawing/2014/main" id="{C196F8AD-D5B2-4EBB-808D-C7663DB68727}"/>
+              </a:ext>
+            </a:extLst>
+          </p:cNvPr>
+          <p:cNvSpPr>
+            <a:spLocks noGrp="1"/>
+          </p:cNvSpPr>
+          <p:nvPr>
+            <p:ph type="sldNum" sz="quarter" idx="4"/>
+          </p:nvPr>
+        </p:nvSpPr>
+        <p:spPr/>
+        <p:txBody>
+          <a:bodyPr/>
+          <a:lstStyle/>
+          <a:p>
+            <a:fld id="{765CECA1-5C9B-4693-A1BD-3F65156FCD02}" type="slidenum">
+              <a:rPr lang="ko-KR" altLang="en-US" smtClean="0"/>
+              <a:pPr/>
+              <a:t>14</a:t>
+            </a:fld>
+            <a:endParaRPr lang="ko-KR" altLang="en-US" dirty="0"/>
+          </a:p>
+        </p:txBody>
+      </p:sp>
+      <p:sp>
+        <p:nvSpPr>
+          <p:cNvPr id="5" name="내용 개체 틀 4">
+            <a:extLst>
+              <a:ext uri="{FF2B5EF4-FFF2-40B4-BE49-F238E27FC236}">
+                <a16:creationId xmlns:a16="http://schemas.microsoft.com/office/drawing/2014/main" id="{E73E60C0-5458-47FB-8DAB-074D7089E7CD}"/>
+              </a:ext>
+            </a:extLst>
+          </p:cNvPr>
+          <p:cNvSpPr>
+            <a:spLocks noGrp="1"/>
+          </p:cNvSpPr>
+          <p:nvPr>
+            <p:ph idx="1"/>
+          </p:nvPr>
+        </p:nvSpPr>
+        <p:spPr/>
+        <p:txBody>
+          <a:bodyPr/>
+          <a:lstStyle/>
+          <a:p>
+            <a:r>
+              <a:rPr lang="en-US" altLang="ko-KR" dirty="0"/>
+              <a:t>CPU</a:t>
+            </a:r>
+            <a:r>
+              <a:rPr lang="ko-KR" altLang="en-US" dirty="0"/>
+              <a:t> </a:t>
+            </a:r>
+            <a:r>
+              <a:rPr lang="en-US" altLang="ko-KR" dirty="0"/>
+              <a:t>Utilization</a:t>
+            </a:r>
+            <a:r>
+              <a:rPr lang="ko-KR" altLang="en-US" dirty="0"/>
+              <a:t> 측정</a:t>
+            </a:r>
+            <a:endParaRPr lang="en-US" altLang="ko-KR" dirty="0"/>
+          </a:p>
+          <a:p>
+            <a:pPr lvl="1"/>
+            <a:r>
+              <a:rPr lang="ko-KR" altLang="en-US" dirty="0"/>
+              <a:t>대체로 컨테이너 개수에 비례</a:t>
+            </a:r>
+            <a:endParaRPr lang="en-US" altLang="ko-KR" dirty="0"/>
+          </a:p>
+          <a:p>
+            <a:endParaRPr lang="en-US" altLang="ko-KR" dirty="0"/>
+          </a:p>
+          <a:p>
+            <a:endParaRPr lang="ko-KR" altLang="en-US" dirty="0"/>
+          </a:p>
+        </p:txBody>
+      </p:sp>
+      <p:pic>
+        <p:nvPicPr>
+          <p:cNvPr id="8" name="Picture 2" descr="https://www.notion.so/image/https%3A%2F%2Fs3-us-west-2.amazonaws.com%2Fsecure.notion-static.com%2F3a4804fc-d66d-4516-8d2d-df630233f71b%2Fresult.png?table=block&amp;id=148fabc5-b2a3-4f44-8de4-1933397d18a5&amp;spaceId=fbba28c8-c995-463f-9b65-239bcd515a43&amp;width=2000&amp;userId=862e33c8-3701-4031-a415-a726468c8a7c&amp;cache=v2">
+            <a:extLst>
+              <a:ext uri="{FF2B5EF4-FFF2-40B4-BE49-F238E27FC236}">
+                <a16:creationId xmlns:a16="http://schemas.microsoft.com/office/drawing/2014/main" id="{A607E6D1-0F7C-4B9D-B8B6-E7DBBC9BD7FD}"/>
+              </a:ext>
+            </a:extLst>
+          </p:cNvPr>
+          <p:cNvPicPr>
+            <a:picLocks noChangeAspect="1" noChangeArrowheads="1"/>
+          </p:cNvPicPr>
+          <p:nvPr/>
+        </p:nvPicPr>
+        <p:blipFill>
+          <a:blip r:embed="rId2">
+            <a:extLst>
+              <a:ext uri="{28A0092B-C50C-407E-A947-70E740481C1C}">
+                <a14:useLocalDpi xmlns:a14="http://schemas.microsoft.com/office/drawing/2010/main" val="0"/>
+              </a:ext>
+            </a:extLst>
+          </a:blip>
+          <a:srcRect/>
+          <a:stretch>
+            <a:fillRect/>
+          </a:stretch>
+        </p:blipFill>
+        <p:spPr bwMode="auto">
+          <a:xfrm>
+            <a:off x="3158484" y="1880269"/>
+            <a:ext cx="5852172" cy="4389129"/>
+          </a:xfrm>
+          <a:prstGeom prst="rect">
+            <a:avLst/>
+          </a:prstGeom>
+          <a:noFill/>
+          <a:extLst>
+            <a:ext uri="{909E8E84-426E-40DD-AFC4-6F175D3DCCD1}">
+              <a14:hiddenFill xmlns:a14="http://schemas.microsoft.com/office/drawing/2010/main">
+                <a:solidFill>
+                  <a:srgbClr val="FFFFFF"/>
+                </a:solidFill>
+              </a14:hiddenFill>
+            </a:ext>
+          </a:extLst>
+        </p:spPr>
+      </p:pic>
+    </p:spTree>
+    <p:extLst>
+      <p:ext uri="{BB962C8B-B14F-4D97-AF65-F5344CB8AC3E}">
+        <p14:creationId xmlns:p14="http://schemas.microsoft.com/office/powerpoint/2010/main" val="4140486843"/>
+      </p:ext>
+    </p:extLst>
+  </p:cSld>
+  <p:clrMapOvr>
+    <a:masterClrMapping/>
+  </p:clrMapOvr>
+</p:sld>
+</file>
+
+<file path=ppt/slides/slide15.xml><?xml version="1.0" encoding="utf-8"?>
+<p:sld xmlns:a="http://schemas.openxmlformats.org/drawingml/2006/main" xmlns:r="http://schemas.openxmlformats.org/officeDocument/2006/relationships" xmlns:p="http://schemas.openxmlformats.org/presentationml/2006/main">
+  <p:cSld>
+    <p:spTree>
+      <p:nvGrpSpPr>
+        <p:cNvPr id="1" name=""/>
+        <p:cNvGrpSpPr/>
+        <p:nvPr/>
+      </p:nvGrpSpPr>
+      <p:grpSpPr>
+        <a:xfrm>
+          <a:off x="0" y="0"/>
+          <a:ext cx="0" cy="0"/>
+          <a:chOff x="0" y="0"/>
+          <a:chExt cx="0" cy="0"/>
+        </a:xfrm>
+      </p:grpSpPr>
+      <p:sp>
+        <p:nvSpPr>
+          <p:cNvPr id="2" name="제목 1">
+            <a:extLst>
+              <a:ext uri="{FF2B5EF4-FFF2-40B4-BE49-F238E27FC236}">
+                <a16:creationId xmlns:a16="http://schemas.microsoft.com/office/drawing/2014/main" id="{2A9BB91E-6001-45DC-8883-E10232D7510F}"/>
+              </a:ext>
+            </a:extLst>
+          </p:cNvPr>
+          <p:cNvSpPr>
+            <a:spLocks noGrp="1"/>
+          </p:cNvSpPr>
+          <p:nvPr>
+            <p:ph type="title"/>
+          </p:nvPr>
+        </p:nvSpPr>
+        <p:spPr/>
+        <p:txBody>
+          <a:bodyPr/>
+          <a:lstStyle/>
+          <a:p>
+            <a:r>
+              <a:rPr kumimoji="1" lang="en-US" altLang="ko-KR" dirty="0"/>
+              <a:t>Resources </a:t>
+            </a:r>
+            <a:r>
+              <a:rPr kumimoji="1" lang="ko-KR" altLang="en-US" dirty="0"/>
+              <a:t>사용량 측정</a:t>
+            </a:r>
+            <a:endParaRPr lang="ko-KR" altLang="en-US" dirty="0"/>
+          </a:p>
+        </p:txBody>
+      </p:sp>
+      <p:sp>
+        <p:nvSpPr>
+          <p:cNvPr id="3" name="내용 개체 틀 2">
+            <a:extLst>
+              <a:ext uri="{FF2B5EF4-FFF2-40B4-BE49-F238E27FC236}">
+                <a16:creationId xmlns:a16="http://schemas.microsoft.com/office/drawing/2014/main" id="{73F60923-5134-4EDB-9EBD-2C02F4FB0584}"/>
+              </a:ext>
+            </a:extLst>
+          </p:cNvPr>
+          <p:cNvSpPr>
+            <a:spLocks noGrp="1"/>
+          </p:cNvSpPr>
+          <p:nvPr>
+            <p:ph idx="1"/>
+          </p:nvPr>
+        </p:nvSpPr>
+        <p:spPr/>
+        <p:txBody>
+          <a:bodyPr/>
+          <a:lstStyle/>
+          <a:p>
+            <a:r>
+              <a:rPr lang="en-US" altLang="ko-KR" dirty="0"/>
+              <a:t>I/O </a:t>
+            </a:r>
+            <a:r>
+              <a:rPr lang="ko-KR" altLang="en-US" dirty="0"/>
+              <a:t>사용량 측정</a:t>
+            </a:r>
+          </a:p>
+        </p:txBody>
+      </p:sp>
+      <p:sp>
+        <p:nvSpPr>
+          <p:cNvPr id="4" name="슬라이드 번호 개체 틀 3">
+            <a:extLst>
+              <a:ext uri="{FF2B5EF4-FFF2-40B4-BE49-F238E27FC236}">
+                <a16:creationId xmlns:a16="http://schemas.microsoft.com/office/drawing/2014/main" id="{34743A34-DF88-4AD2-AF10-6951353A5DBC}"/>
+              </a:ext>
+            </a:extLst>
+          </p:cNvPr>
+          <p:cNvSpPr>
+            <a:spLocks noGrp="1"/>
+          </p:cNvSpPr>
+          <p:nvPr>
+            <p:ph type="sldNum" sz="quarter" idx="4"/>
+          </p:nvPr>
+        </p:nvSpPr>
+        <p:spPr/>
+        <p:txBody>
+          <a:bodyPr/>
+          <a:lstStyle/>
+          <a:p>
+            <a:fld id="{765CECA1-5C9B-4693-A1BD-3F65156FCD02}" type="slidenum">
+              <a:rPr lang="ko-KR" altLang="en-US" smtClean="0"/>
+              <a:pPr/>
+              <a:t>15</a:t>
+            </a:fld>
+            <a:endParaRPr lang="ko-KR" altLang="en-US" dirty="0"/>
+          </a:p>
+        </p:txBody>
+      </p:sp>
+      <p:pic>
+        <p:nvPicPr>
+          <p:cNvPr id="1028" name="Picture 4" descr="https://www.notion.so/image/https%3A%2F%2Fs3-us-west-2.amazonaws.com%2Fsecure.notion-static.com%2Fb6a162f5-c4b2-4911-b946-c57e3e0eb6b1%2Fwrite_result.png?table=block&amp;id=ba8e25ea-69f9-4794-a0fb-6bf79eaec4e5&amp;spaceId=fbba28c8-c995-463f-9b65-239bcd515a43&amp;width=2000&amp;userId=862e33c8-3701-4031-a415-a726468c8a7c&amp;cache=v2">
+            <a:extLst>
+              <a:ext uri="{FF2B5EF4-FFF2-40B4-BE49-F238E27FC236}">
+                <a16:creationId xmlns:a16="http://schemas.microsoft.com/office/drawing/2014/main" id="{DB81D6D8-B562-40EA-A592-6E8260F27B0E}"/>
+              </a:ext>
+            </a:extLst>
+          </p:cNvPr>
+          <p:cNvPicPr>
+            <a:picLocks noChangeAspect="1" noChangeArrowheads="1"/>
+          </p:cNvPicPr>
+          <p:nvPr/>
+        </p:nvPicPr>
+        <p:blipFill>
+          <a:blip r:embed="rId2">
+            <a:extLst>
+              <a:ext uri="{28A0092B-C50C-407E-A947-70E740481C1C}">
+                <a14:useLocalDpi xmlns:a14="http://schemas.microsoft.com/office/drawing/2010/main" val="0"/>
+              </a:ext>
+            </a:extLst>
+          </a:blip>
+          <a:srcRect/>
+          <a:stretch>
+            <a:fillRect/>
+          </a:stretch>
+        </p:blipFill>
+        <p:spPr bwMode="auto">
+          <a:xfrm>
+            <a:off x="6213230" y="1697399"/>
+            <a:ext cx="6096000" cy="4572000"/>
+          </a:xfrm>
+          <a:prstGeom prst="rect">
+            <a:avLst/>
+          </a:prstGeom>
+          <a:noFill/>
+          <a:extLst>
+            <a:ext uri="{909E8E84-426E-40DD-AFC4-6F175D3DCCD1}">
+              <a14:hiddenFill xmlns:a14="http://schemas.microsoft.com/office/drawing/2010/main">
+                <a:solidFill>
+                  <a:srgbClr val="FFFFFF"/>
+                </a:solidFill>
+              </a14:hiddenFill>
+            </a:ext>
+          </a:extLst>
+        </p:spPr>
+      </p:pic>
+      <p:pic>
+        <p:nvPicPr>
+          <p:cNvPr id="6" name="그림 5">
+            <a:extLst>
+              <a:ext uri="{FF2B5EF4-FFF2-40B4-BE49-F238E27FC236}">
+                <a16:creationId xmlns:a16="http://schemas.microsoft.com/office/drawing/2014/main" id="{FB0946CE-D037-4E60-964E-4E0EB52C8180}"/>
+              </a:ext>
+            </a:extLst>
+          </p:cNvPr>
+          <p:cNvPicPr>
+            <a:picLocks noChangeAspect="1"/>
+          </p:cNvPicPr>
+          <p:nvPr/>
+        </p:nvPicPr>
+        <p:blipFill>
+          <a:blip r:embed="rId3">
+            <a:extLst>
+              <a:ext uri="{28A0092B-C50C-407E-A947-70E740481C1C}">
+                <a14:useLocalDpi xmlns:a14="http://schemas.microsoft.com/office/drawing/2010/main" val="0"/>
+              </a:ext>
+            </a:extLst>
+          </a:blip>
+          <a:stretch>
+            <a:fillRect/>
+          </a:stretch>
+        </p:blipFill>
+        <p:spPr>
+          <a:xfrm>
+            <a:off x="94370" y="1697399"/>
+            <a:ext cx="6096000" cy="4572000"/>
+          </a:xfrm>
+          <a:prstGeom prst="rect">
+            <a:avLst/>
+          </a:prstGeom>
+        </p:spPr>
+      </p:pic>
+    </p:spTree>
+    <p:extLst>
+      <p:ext uri="{BB962C8B-B14F-4D97-AF65-F5344CB8AC3E}">
+        <p14:creationId xmlns:p14="http://schemas.microsoft.com/office/powerpoint/2010/main" val="3383570981"/>
       </p:ext>
     </p:extLst>
   </p:cSld>

</xml_diff>

<commit_message>
feat: Add fio result in container resources slide
</commit_message>
<xml_diff>
--- a/slide/Docker container resources 사용량 측정.pptx
+++ b/slide/Docker container resources 사용량 측정.pptx
@@ -5,7 +5,7 @@
     <p:sldMasterId id="2147483648" r:id="rId1"/>
   </p:sldMasterIdLst>
   <p:notesMasterIdLst>
-    <p:notesMasterId r:id="rId17"/>
+    <p:notesMasterId r:id="rId19"/>
   </p:notesMasterIdLst>
   <p:sldIdLst>
     <p:sldId id="259" r:id="rId2"/>
@@ -23,28 +23,30 @@
     <p:sldId id="271" r:id="rId14"/>
     <p:sldId id="272" r:id="rId15"/>
     <p:sldId id="273" r:id="rId16"/>
+    <p:sldId id="274" r:id="rId17"/>
+    <p:sldId id="275" r:id="rId18"/>
   </p:sldIdLst>
   <p:sldSz cx="12192000" cy="6858000"/>
   <p:notesSz cx="6858000" cy="9144000"/>
   <p:embeddedFontLst>
     <p:embeddedFont>
       <p:font typeface="lato" panose="020B0600000101010101" charset="0"/>
-      <p:regular r:id="rId18"/>
-      <p:bold r:id="rId19"/>
-      <p:italic r:id="rId20"/>
-      <p:boldItalic r:id="rId21"/>
+      <p:regular r:id="rId20"/>
+      <p:bold r:id="rId21"/>
+      <p:italic r:id="rId22"/>
+      <p:boldItalic r:id="rId23"/>
     </p:embeddedFont>
     <p:embeddedFont>
       <p:font typeface="lato" panose="020B0600000101010101" charset="0"/>
-      <p:regular r:id="rId18"/>
-      <p:bold r:id="rId19"/>
-      <p:italic r:id="rId20"/>
-      <p:boldItalic r:id="rId21"/>
+      <p:regular r:id="rId20"/>
+      <p:bold r:id="rId21"/>
+      <p:italic r:id="rId22"/>
+      <p:boldItalic r:id="rId23"/>
     </p:embeddedFont>
     <p:embeddedFont>
       <p:font typeface="맑은 고딕" panose="020B0503020000020004" pitchFamily="50" charset="-127"/>
-      <p:regular r:id="rId22"/>
-      <p:bold r:id="rId23"/>
+      <p:regular r:id="rId24"/>
+      <p:bold r:id="rId25"/>
     </p:embeddedFont>
   </p:embeddedFontLst>
   <p:kinsoku lang="ko-KR" invalStChars="、。，．：；？！’”）〕］｝〉》」』】°℃％!%￠),.:;?]}&gt;" invalEndChars="‘“（〔［｛〈《「『【￥＄\￦￡€([{&lt;$"/>
@@ -264,7 +266,7 @@
           <a:p>
             <a:fld id="{3B653B65-7BB5-4D60-9879-5AFC8E04B446}" type="datetimeFigureOut">
               <a:rPr lang="ko-KR" altLang="en-US" smtClean="0"/>
-              <a:t>2022-03-10</a:t>
+              <a:t>2022-03-16</a:t>
             </a:fld>
             <a:endParaRPr lang="ko-KR" altLang="en-US"/>
           </a:p>
@@ -3307,6 +3309,552 @@
     <p:extLst>
       <p:ext uri="{BB962C8B-B14F-4D97-AF65-F5344CB8AC3E}">
         <p14:creationId xmlns:p14="http://schemas.microsoft.com/office/powerpoint/2010/main" val="3383570981"/>
+      </p:ext>
+    </p:extLst>
+  </p:cSld>
+  <p:clrMapOvr>
+    <a:masterClrMapping/>
+  </p:clrMapOvr>
+</p:sld>
+</file>
+
+<file path=ppt/slides/slide16.xml><?xml version="1.0" encoding="utf-8"?>
+<p:sld xmlns:a="http://schemas.openxmlformats.org/drawingml/2006/main" xmlns:r="http://schemas.openxmlformats.org/officeDocument/2006/relationships" xmlns:p="http://schemas.openxmlformats.org/presentationml/2006/main">
+  <p:cSld>
+    <p:spTree>
+      <p:nvGrpSpPr>
+        <p:cNvPr id="1" name=""/>
+        <p:cNvGrpSpPr/>
+        <p:nvPr/>
+      </p:nvGrpSpPr>
+      <p:grpSpPr>
+        <a:xfrm>
+          <a:off x="0" y="0"/>
+          <a:ext cx="0" cy="0"/>
+          <a:chOff x="0" y="0"/>
+          <a:chExt cx="0" cy="0"/>
+        </a:xfrm>
+      </p:grpSpPr>
+      <p:sp>
+        <p:nvSpPr>
+          <p:cNvPr id="2" name="제목 1">
+            <a:extLst>
+              <a:ext uri="{FF2B5EF4-FFF2-40B4-BE49-F238E27FC236}">
+                <a16:creationId xmlns:a16="http://schemas.microsoft.com/office/drawing/2014/main" id="{120F768C-EF57-4581-B282-BEAB18D9C195}"/>
+              </a:ext>
+            </a:extLst>
+          </p:cNvPr>
+          <p:cNvSpPr>
+            <a:spLocks noGrp="1"/>
+          </p:cNvSpPr>
+          <p:nvPr>
+            <p:ph type="title"/>
+          </p:nvPr>
+        </p:nvSpPr>
+        <p:spPr/>
+        <p:txBody>
+          <a:bodyPr/>
+          <a:lstStyle/>
+          <a:p>
+            <a:r>
+              <a:rPr kumimoji="1" lang="en-US" altLang="ko-KR" dirty="0"/>
+              <a:t>Resources </a:t>
+            </a:r>
+            <a:r>
+              <a:rPr kumimoji="1" lang="ko-KR" altLang="en-US" dirty="0"/>
+              <a:t>사용량 측정</a:t>
+            </a:r>
+            <a:endParaRPr lang="ko-KR" altLang="en-US" dirty="0"/>
+          </a:p>
+        </p:txBody>
+      </p:sp>
+      <p:sp>
+        <p:nvSpPr>
+          <p:cNvPr id="3" name="내용 개체 틀 2">
+            <a:extLst>
+              <a:ext uri="{FF2B5EF4-FFF2-40B4-BE49-F238E27FC236}">
+                <a16:creationId xmlns:a16="http://schemas.microsoft.com/office/drawing/2014/main" id="{C44C274D-4ED0-4435-9A43-22CE17FABD35}"/>
+              </a:ext>
+            </a:extLst>
+          </p:cNvPr>
+          <p:cNvSpPr>
+            <a:spLocks noGrp="1"/>
+          </p:cNvSpPr>
+          <p:nvPr>
+            <p:ph idx="1"/>
+          </p:nvPr>
+        </p:nvSpPr>
+        <p:spPr/>
+        <p:txBody>
+          <a:bodyPr/>
+          <a:lstStyle/>
+          <a:p>
+            <a:r>
+              <a:rPr lang="ko-KR" altLang="en-US" dirty="0"/>
+              <a:t>정확한 </a:t>
+            </a:r>
+            <a:r>
+              <a:rPr lang="en-US" altLang="ko-KR" dirty="0"/>
+              <a:t>I/O </a:t>
+            </a:r>
+            <a:r>
+              <a:rPr lang="ko-KR" altLang="en-US" dirty="0"/>
+              <a:t>사용량 측정을 위해 </a:t>
+            </a:r>
+            <a:r>
+              <a:rPr lang="en-US" altLang="ko-KR" dirty="0"/>
+              <a:t>FIO </a:t>
+            </a:r>
+            <a:r>
+              <a:rPr lang="ko-KR" altLang="en-US" dirty="0"/>
+              <a:t>벤치마크 사용</a:t>
+            </a:r>
+            <a:endParaRPr lang="en-US" altLang="ko-KR" dirty="0"/>
+          </a:p>
+          <a:p>
+            <a:r>
+              <a:rPr lang="en-US" altLang="ko-KR" dirty="0"/>
+              <a:t>500MB </a:t>
+            </a:r>
+            <a:r>
+              <a:rPr lang="ko-KR" altLang="en-US" dirty="0"/>
+              <a:t>크기의 파일 </a:t>
+            </a:r>
+            <a:r>
+              <a:rPr lang="en-US" altLang="ko-KR" dirty="0"/>
+              <a:t>R/W </a:t>
+            </a:r>
+            <a:r>
+              <a:rPr lang="ko-KR" altLang="en-US" dirty="0"/>
+              <a:t>진행</a:t>
+            </a:r>
+            <a:endParaRPr lang="en-US" altLang="ko-KR" dirty="0"/>
+          </a:p>
+          <a:p>
+            <a:r>
+              <a:rPr lang="ko-KR" altLang="en-US" dirty="0"/>
+              <a:t>로그 파일 </a:t>
+            </a:r>
+            <a:r>
+              <a:rPr lang="en-US" altLang="ko-KR" dirty="0"/>
+              <a:t>Write </a:t>
+            </a:r>
+            <a:r>
+              <a:rPr lang="ko-KR" altLang="en-US" dirty="0"/>
+              <a:t>로 인해 </a:t>
+            </a:r>
+            <a:r>
+              <a:rPr lang="en-US" altLang="ko-KR" dirty="0"/>
+              <a:t>noise </a:t>
+            </a:r>
+            <a:r>
+              <a:rPr lang="ko-KR" altLang="en-US" dirty="0"/>
+              <a:t>발생한다고 판단</a:t>
+            </a:r>
+          </a:p>
+        </p:txBody>
+      </p:sp>
+      <p:sp>
+        <p:nvSpPr>
+          <p:cNvPr id="4" name="슬라이드 번호 개체 틀 3">
+            <a:extLst>
+              <a:ext uri="{FF2B5EF4-FFF2-40B4-BE49-F238E27FC236}">
+                <a16:creationId xmlns:a16="http://schemas.microsoft.com/office/drawing/2014/main" id="{9485F396-C9BD-4D93-A266-1F766471F939}"/>
+              </a:ext>
+            </a:extLst>
+          </p:cNvPr>
+          <p:cNvSpPr>
+            <a:spLocks noGrp="1"/>
+          </p:cNvSpPr>
+          <p:nvPr>
+            <p:ph type="sldNum" sz="quarter" idx="4"/>
+          </p:nvPr>
+        </p:nvSpPr>
+        <p:spPr/>
+        <p:txBody>
+          <a:bodyPr/>
+          <a:lstStyle/>
+          <a:p>
+            <a:fld id="{765CECA1-5C9B-4693-A1BD-3F65156FCD02}" type="slidenum">
+              <a:rPr lang="ko-KR" altLang="en-US" smtClean="0"/>
+              <a:pPr/>
+              <a:t>16</a:t>
+            </a:fld>
+            <a:endParaRPr lang="ko-KR" altLang="en-US" dirty="0"/>
+          </a:p>
+        </p:txBody>
+      </p:sp>
+      <p:pic>
+        <p:nvPicPr>
+          <p:cNvPr id="1028" name="Picture 4" descr="https://www.notion.so/image/https%3A%2F%2Fs3-us-west-2.amazonaws.com%2Fsecure.notion-static.com%2F24f51659-f706-4e94-8b3b-770802261565%2Frere.png?table=block&amp;id=f5ff921c-acba-4fc9-8cfa-7f5a440d5035&amp;spaceId=fbba28c8-c995-463f-9b65-239bcd515a43&amp;width=1730&amp;userId=862e33c8-3701-4031-a415-a726468c8a7c&amp;cache=v2">
+            <a:extLst>
+              <a:ext uri="{FF2B5EF4-FFF2-40B4-BE49-F238E27FC236}">
+                <a16:creationId xmlns:a16="http://schemas.microsoft.com/office/drawing/2014/main" id="{49BE720D-B17A-4ED8-B05C-23BA6DC70A77}"/>
+              </a:ext>
+            </a:extLst>
+          </p:cNvPr>
+          <p:cNvPicPr>
+            <a:picLocks noChangeAspect="1" noChangeArrowheads="1"/>
+          </p:cNvPicPr>
+          <p:nvPr/>
+        </p:nvPicPr>
+        <p:blipFill>
+          <a:blip r:embed="rId2">
+            <a:extLst>
+              <a:ext uri="{28A0092B-C50C-407E-A947-70E740481C1C}">
+                <a14:useLocalDpi xmlns:a14="http://schemas.microsoft.com/office/drawing/2010/main" val="0"/>
+              </a:ext>
+            </a:extLst>
+          </a:blip>
+          <a:srcRect/>
+          <a:stretch>
+            <a:fillRect/>
+          </a:stretch>
+        </p:blipFill>
+        <p:spPr bwMode="auto">
+          <a:xfrm>
+            <a:off x="806385" y="2685068"/>
+            <a:ext cx="4900245" cy="3675184"/>
+          </a:xfrm>
+          <a:prstGeom prst="rect">
+            <a:avLst/>
+          </a:prstGeom>
+          <a:noFill/>
+          <a:extLst>
+            <a:ext uri="{909E8E84-426E-40DD-AFC4-6F175D3DCCD1}">
+              <a14:hiddenFill xmlns:a14="http://schemas.microsoft.com/office/drawing/2010/main">
+                <a:solidFill>
+                  <a:srgbClr val="FFFFFF"/>
+                </a:solidFill>
+              </a14:hiddenFill>
+            </a:ext>
+          </a:extLst>
+        </p:spPr>
+      </p:pic>
+      <p:pic>
+        <p:nvPicPr>
+          <p:cNvPr id="1030" name="Picture 6" descr="https://www.notion.so/image/https%3A%2F%2Fs3-us-west-2.amazonaws.com%2Fsecure.notion-static.com%2F3434ff9f-0fc0-41b3-89a6-0ee537193dbc%2Frewr.png?table=block&amp;id=1d7154ab-8584-4cd7-bd69-47b07246460f&amp;spaceId=fbba28c8-c995-463f-9b65-239bcd515a43&amp;width=1730&amp;userId=862e33c8-3701-4031-a415-a726468c8a7c&amp;cache=v2">
+            <a:extLst>
+              <a:ext uri="{FF2B5EF4-FFF2-40B4-BE49-F238E27FC236}">
+                <a16:creationId xmlns:a16="http://schemas.microsoft.com/office/drawing/2014/main" id="{985C58B4-6214-4737-9ECA-CF0AA1F8372C}"/>
+              </a:ext>
+            </a:extLst>
+          </p:cNvPr>
+          <p:cNvPicPr>
+            <a:picLocks noChangeAspect="1" noChangeArrowheads="1"/>
+          </p:cNvPicPr>
+          <p:nvPr/>
+        </p:nvPicPr>
+        <p:blipFill>
+          <a:blip r:embed="rId3">
+            <a:extLst>
+              <a:ext uri="{28A0092B-C50C-407E-A947-70E740481C1C}">
+                <a14:useLocalDpi xmlns:a14="http://schemas.microsoft.com/office/drawing/2010/main" val="0"/>
+              </a:ext>
+            </a:extLst>
+          </a:blip>
+          <a:srcRect/>
+          <a:stretch>
+            <a:fillRect/>
+          </a:stretch>
+        </p:blipFill>
+        <p:spPr bwMode="auto">
+          <a:xfrm>
+            <a:off x="6471138" y="2685068"/>
+            <a:ext cx="4900245" cy="3675184"/>
+          </a:xfrm>
+          <a:prstGeom prst="rect">
+            <a:avLst/>
+          </a:prstGeom>
+          <a:noFill/>
+          <a:extLst>
+            <a:ext uri="{909E8E84-426E-40DD-AFC4-6F175D3DCCD1}">
+              <a14:hiddenFill xmlns:a14="http://schemas.microsoft.com/office/drawing/2010/main">
+                <a:solidFill>
+                  <a:srgbClr val="FFFFFF"/>
+                </a:solidFill>
+              </a14:hiddenFill>
+            </a:ext>
+          </a:extLst>
+        </p:spPr>
+      </p:pic>
+    </p:spTree>
+    <p:extLst>
+      <p:ext uri="{BB962C8B-B14F-4D97-AF65-F5344CB8AC3E}">
+        <p14:creationId xmlns:p14="http://schemas.microsoft.com/office/powerpoint/2010/main" val="4091287887"/>
+      </p:ext>
+    </p:extLst>
+  </p:cSld>
+  <p:clrMapOvr>
+    <a:masterClrMapping/>
+  </p:clrMapOvr>
+</p:sld>
+</file>
+
+<file path=ppt/slides/slide17.xml><?xml version="1.0" encoding="utf-8"?>
+<p:sld xmlns:a="http://schemas.openxmlformats.org/drawingml/2006/main" xmlns:r="http://schemas.openxmlformats.org/officeDocument/2006/relationships" xmlns:p="http://schemas.openxmlformats.org/presentationml/2006/main">
+  <p:cSld>
+    <p:spTree>
+      <p:nvGrpSpPr>
+        <p:cNvPr id="1" name=""/>
+        <p:cNvGrpSpPr/>
+        <p:nvPr/>
+      </p:nvGrpSpPr>
+      <p:grpSpPr>
+        <a:xfrm>
+          <a:off x="0" y="0"/>
+          <a:ext cx="0" cy="0"/>
+          <a:chOff x="0" y="0"/>
+          <a:chExt cx="0" cy="0"/>
+        </a:xfrm>
+      </p:grpSpPr>
+      <p:sp>
+        <p:nvSpPr>
+          <p:cNvPr id="2" name="제목 1">
+            <a:extLst>
+              <a:ext uri="{FF2B5EF4-FFF2-40B4-BE49-F238E27FC236}">
+                <a16:creationId xmlns:a16="http://schemas.microsoft.com/office/drawing/2014/main" id="{97B8E7F1-E96E-41B7-9CF1-4C51A0601A20}"/>
+              </a:ext>
+            </a:extLst>
+          </p:cNvPr>
+          <p:cNvSpPr>
+            <a:spLocks noGrp="1"/>
+          </p:cNvSpPr>
+          <p:nvPr>
+            <p:ph type="title"/>
+          </p:nvPr>
+        </p:nvSpPr>
+        <p:spPr/>
+        <p:txBody>
+          <a:bodyPr/>
+          <a:lstStyle/>
+          <a:p>
+            <a:r>
+              <a:rPr kumimoji="1" lang="en-US" altLang="ko-KR" dirty="0"/>
+              <a:t>Resources </a:t>
+            </a:r>
+            <a:r>
+              <a:rPr kumimoji="1" lang="ko-KR" altLang="en-US" dirty="0"/>
+              <a:t>사용량 측정</a:t>
+            </a:r>
+            <a:endParaRPr lang="ko-KR" altLang="en-US" dirty="0"/>
+          </a:p>
+        </p:txBody>
+      </p:sp>
+      <p:sp>
+        <p:nvSpPr>
+          <p:cNvPr id="3" name="내용 개체 틀 2">
+            <a:extLst>
+              <a:ext uri="{FF2B5EF4-FFF2-40B4-BE49-F238E27FC236}">
+                <a16:creationId xmlns:a16="http://schemas.microsoft.com/office/drawing/2014/main" id="{7ECC95C2-2AC6-48C2-BF29-B805A3B3251F}"/>
+              </a:ext>
+            </a:extLst>
+          </p:cNvPr>
+          <p:cNvSpPr>
+            <a:spLocks noGrp="1"/>
+          </p:cNvSpPr>
+          <p:nvPr>
+            <p:ph idx="1"/>
+          </p:nvPr>
+        </p:nvSpPr>
+        <p:spPr/>
+        <p:txBody>
+          <a:bodyPr/>
+          <a:lstStyle/>
+          <a:p>
+            <a:r>
+              <a:rPr lang="en-US" altLang="ko-KR" dirty="0" err="1"/>
+              <a:t>nvme</a:t>
+            </a:r>
+            <a:r>
+              <a:rPr lang="en-US" altLang="ko-KR" dirty="0"/>
+              <a:t> SSD </a:t>
+            </a:r>
+            <a:r>
+              <a:rPr lang="ko-KR" altLang="en-US" dirty="0"/>
+              <a:t>대신 </a:t>
+            </a:r>
+            <a:r>
+              <a:rPr lang="en-US" altLang="ko-KR" dirty="0"/>
+              <a:t>/dev/</a:t>
+            </a:r>
+            <a:r>
+              <a:rPr lang="en-US" altLang="ko-KR" dirty="0" err="1"/>
+              <a:t>sda</a:t>
+            </a:r>
+            <a:r>
+              <a:rPr lang="en-US" altLang="ko-KR" dirty="0"/>
+              <a:t> </a:t>
+            </a:r>
+            <a:r>
+              <a:rPr lang="ko-KR" altLang="en-US" dirty="0"/>
+              <a:t>마운트 후 로그 파일 따로 기록</a:t>
+            </a:r>
+            <a:endParaRPr lang="en-US" altLang="ko-KR" dirty="0"/>
+          </a:p>
+          <a:p>
+            <a:r>
+              <a:rPr lang="en-US" altLang="ko-KR" dirty="0"/>
+              <a:t>Read </a:t>
+            </a:r>
+            <a:r>
+              <a:rPr lang="ko-KR" altLang="en-US" dirty="0"/>
+              <a:t>대역폭 동일</a:t>
+            </a:r>
+            <a:r>
+              <a:rPr lang="en-US" altLang="ko-KR" dirty="0"/>
+              <a:t>. Cache </a:t>
+            </a:r>
+            <a:r>
+              <a:rPr lang="ko-KR" altLang="en-US" dirty="0"/>
+              <a:t>추정</a:t>
+            </a:r>
+            <a:endParaRPr lang="en-US" altLang="ko-KR" dirty="0"/>
+          </a:p>
+          <a:p>
+            <a:r>
+              <a:rPr lang="en-US" altLang="ko-KR" dirty="0"/>
+              <a:t>Write noise </a:t>
+            </a:r>
+            <a:r>
+              <a:rPr lang="ko-KR" altLang="en-US" dirty="0"/>
+              <a:t>동일</a:t>
+            </a:r>
+            <a:endParaRPr lang="en-US" altLang="ko-KR" dirty="0"/>
+          </a:p>
+          <a:p>
+            <a:endParaRPr lang="ko-KR" altLang="en-US" dirty="0"/>
+          </a:p>
+        </p:txBody>
+      </p:sp>
+      <p:sp>
+        <p:nvSpPr>
+          <p:cNvPr id="4" name="슬라이드 번호 개체 틀 3">
+            <a:extLst>
+              <a:ext uri="{FF2B5EF4-FFF2-40B4-BE49-F238E27FC236}">
+                <a16:creationId xmlns:a16="http://schemas.microsoft.com/office/drawing/2014/main" id="{E5199184-165D-4761-B0A9-8AB8A61FAA8D}"/>
+              </a:ext>
+            </a:extLst>
+          </p:cNvPr>
+          <p:cNvSpPr>
+            <a:spLocks noGrp="1"/>
+          </p:cNvSpPr>
+          <p:nvPr>
+            <p:ph type="sldNum" sz="quarter" idx="4"/>
+          </p:nvPr>
+        </p:nvSpPr>
+        <p:spPr/>
+        <p:txBody>
+          <a:bodyPr/>
+          <a:lstStyle/>
+          <a:p>
+            <a:fld id="{765CECA1-5C9B-4693-A1BD-3F65156FCD02}" type="slidenum">
+              <a:rPr lang="ko-KR" altLang="en-US" smtClean="0"/>
+              <a:pPr/>
+              <a:t>17</a:t>
+            </a:fld>
+            <a:endParaRPr lang="ko-KR" altLang="en-US" dirty="0"/>
+          </a:p>
+        </p:txBody>
+      </p:sp>
+      <p:pic>
+        <p:nvPicPr>
+          <p:cNvPr id="2050" name="Picture 2" descr="https://www.notion.so/image/https%3A%2F%2Fs3-us-west-2.amazonaws.com%2Fsecure.notion-static.com%2F94f66c94-9806-426b-8e75-f4ca57acac97%2Froot_re.png?table=block&amp;id=ccd18dc1-f7f6-431d-b8ee-2bd1518ee611&amp;spaceId=fbba28c8-c995-463f-9b65-239bcd515a43&amp;width=1730&amp;userId=862e33c8-3701-4031-a415-a726468c8a7c&amp;cache=v2">
+            <a:extLst>
+              <a:ext uri="{FF2B5EF4-FFF2-40B4-BE49-F238E27FC236}">
+                <a16:creationId xmlns:a16="http://schemas.microsoft.com/office/drawing/2014/main" id="{8A81331D-6E02-4A06-9CC1-1358F570D2AF}"/>
+              </a:ext>
+            </a:extLst>
+          </p:cNvPr>
+          <p:cNvPicPr>
+            <a:picLocks noChangeAspect="1" noChangeArrowheads="1"/>
+          </p:cNvPicPr>
+          <p:nvPr/>
+        </p:nvPicPr>
+        <p:blipFill>
+          <a:blip r:embed="rId2">
+            <a:extLst>
+              <a:ext uri="{28A0092B-C50C-407E-A947-70E740481C1C}">
+                <a14:useLocalDpi xmlns:a14="http://schemas.microsoft.com/office/drawing/2010/main" val="0"/>
+              </a:ext>
+            </a:extLst>
+          </a:blip>
+          <a:srcRect/>
+          <a:stretch>
+            <a:fillRect/>
+          </a:stretch>
+        </p:blipFill>
+        <p:spPr bwMode="auto">
+          <a:xfrm>
+            <a:off x="450762" y="2823387"/>
+            <a:ext cx="5503938" cy="3616512"/>
+          </a:xfrm>
+          <a:prstGeom prst="rect">
+            <a:avLst/>
+          </a:prstGeom>
+          <a:noFill/>
+          <a:extLst>
+            <a:ext uri="{909E8E84-426E-40DD-AFC4-6F175D3DCCD1}">
+              <a14:hiddenFill xmlns:a14="http://schemas.microsoft.com/office/drawing/2010/main">
+                <a:solidFill>
+                  <a:srgbClr val="FFFFFF"/>
+                </a:solidFill>
+              </a14:hiddenFill>
+            </a:ext>
+          </a:extLst>
+        </p:spPr>
+      </p:pic>
+      <p:pic>
+        <p:nvPicPr>
+          <p:cNvPr id="2052" name="Picture 4" descr="https://www.notion.so/image/https%3A%2F%2Fs3-us-west-2.amazonaws.com%2Fsecure.notion-static.com%2Feca9a5db-392f-42a5-bca5-e931cdc28329%2Froot_write.png?table=block&amp;id=60224dec-4a84-40d7-8050-b3b788e98fad&amp;spaceId=fbba28c8-c995-463f-9b65-239bcd515a43&amp;width=1730&amp;userId=862e33c8-3701-4031-a415-a726468c8a7c&amp;cache=v2">
+            <a:extLst>
+              <a:ext uri="{FF2B5EF4-FFF2-40B4-BE49-F238E27FC236}">
+                <a16:creationId xmlns:a16="http://schemas.microsoft.com/office/drawing/2014/main" id="{018A7505-0BDE-466B-BDB8-CB9F13141917}"/>
+              </a:ext>
+            </a:extLst>
+          </p:cNvPr>
+          <p:cNvPicPr>
+            <a:picLocks noChangeAspect="1" noChangeArrowheads="1"/>
+          </p:cNvPicPr>
+          <p:nvPr/>
+        </p:nvPicPr>
+        <p:blipFill>
+          <a:blip r:embed="rId3">
+            <a:extLst>
+              <a:ext uri="{28A0092B-C50C-407E-A947-70E740481C1C}">
+                <a14:useLocalDpi xmlns:a14="http://schemas.microsoft.com/office/drawing/2010/main" val="0"/>
+              </a:ext>
+            </a:extLst>
+          </a:blip>
+          <a:srcRect/>
+          <a:stretch>
+            <a:fillRect/>
+          </a:stretch>
+        </p:blipFill>
+        <p:spPr bwMode="auto">
+          <a:xfrm>
+            <a:off x="6409143" y="2823386"/>
+            <a:ext cx="4822016" cy="3616512"/>
+          </a:xfrm>
+          <a:prstGeom prst="rect">
+            <a:avLst/>
+          </a:prstGeom>
+          <a:noFill/>
+          <a:extLst>
+            <a:ext uri="{909E8E84-426E-40DD-AFC4-6F175D3DCCD1}">
+              <a14:hiddenFill xmlns:a14="http://schemas.microsoft.com/office/drawing/2010/main">
+                <a:solidFill>
+                  <a:srgbClr val="FFFFFF"/>
+                </a:solidFill>
+              </a14:hiddenFill>
+            </a:ext>
+          </a:extLst>
+        </p:spPr>
+      </p:pic>
+    </p:spTree>
+    <p:extLst>
+      <p:ext uri="{BB962C8B-B14F-4D97-AF65-F5344CB8AC3E}">
+        <p14:creationId xmlns:p14="http://schemas.microsoft.com/office/powerpoint/2010/main" val="2441613893"/>
       </p:ext>
     </p:extLst>
   </p:cSld>

</xml_diff>